<commit_message>
Added PHP Script slide to presentation
</commit_message>
<xml_diff>
--- a/OUR-PRESENTATION.pptx
+++ b/OUR-PRESENTATION.pptx
@@ -16,9 +16,10 @@
     <p:sldId id="262" r:id="rId10"/>
     <p:sldId id="263" r:id="rId11"/>
     <p:sldId id="265" r:id="rId12"/>
-    <p:sldId id="260" r:id="rId13"/>
-    <p:sldId id="266" r:id="rId14"/>
-    <p:sldId id="267" r:id="rId15"/>
+    <p:sldId id="270" r:id="rId13"/>
+    <p:sldId id="260" r:id="rId14"/>
+    <p:sldId id="266" r:id="rId15"/>
+    <p:sldId id="267" r:id="rId16"/>
   </p:sldIdLst>
   <p:sldSz cx="12192000" cy="6858000"/>
   <p:notesSz cx="6858000" cy="9144000"/>
@@ -3970,44 +3971,6 @@
           </a:fontRef>
         </p:style>
       </p:cxnSp>
-      <p:sp>
-        <p:nvSpPr>
-          <p:cNvPr id="34" name="TextBox 33"/>
-          <p:cNvSpPr txBox="1"/>
-          <p:nvPr/>
-        </p:nvSpPr>
-        <p:spPr>
-          <a:xfrm>
-            <a:off x="3830129" y="6085134"/>
-            <a:ext cx="3901978" cy="369332"/>
-          </a:xfrm>
-          <a:prstGeom prst="rect">
-            <a:avLst/>
-          </a:prstGeom>
-          <a:noFill/>
-        </p:spPr>
-        <p:txBody>
-          <a:bodyPr wrap="square" rtlCol="0">
-            <a:spAutoFit/>
-          </a:bodyPr>
-          <a:lstStyle/>
-          <a:p>
-            <a:r>
-              <a:rPr lang="en-US" dirty="0" smtClean="0"/>
-              <a:t>Utilized </a:t>
-            </a:r>
-            <a:r>
-              <a:rPr lang="en-US" dirty="0" err="1" smtClean="0"/>
-              <a:t>php</a:t>
-            </a:r>
-            <a:r>
-              <a:rPr lang="en-US" dirty="0" smtClean="0"/>
-              <a:t> scripts to access database</a:t>
-            </a:r>
-            <a:endParaRPr lang="en-US" dirty="0"/>
-          </a:p>
-        </p:txBody>
-      </p:sp>
       <p:graphicFrame>
         <p:nvGraphicFramePr>
           <p:cNvPr id="15" name="Table 14"/>
@@ -4918,59 +4881,6 @@
                       </p:childTnLst>
                     </p:cTn>
                   </p:par>
-                  <p:par>
-                    <p:cTn id="48" fill="hold">
-                      <p:stCondLst>
-                        <p:cond delay="indefinite"/>
-                      </p:stCondLst>
-                      <p:childTnLst>
-                        <p:par>
-                          <p:cTn id="49" fill="hold">
-                            <p:stCondLst>
-                              <p:cond delay="0"/>
-                            </p:stCondLst>
-                            <p:childTnLst>
-                              <p:par>
-                                <p:cTn id="50" presetID="10" presetClass="entr" presetSubtype="0" fill="hold" grpId="0" nodeType="clickEffect">
-                                  <p:stCondLst>
-                                    <p:cond delay="0"/>
-                                  </p:stCondLst>
-                                  <p:childTnLst>
-                                    <p:set>
-                                      <p:cBhvr>
-                                        <p:cTn id="51" dur="1" fill="hold">
-                                          <p:stCondLst>
-                                            <p:cond delay="0"/>
-                                          </p:stCondLst>
-                                        </p:cTn>
-                                        <p:tgtEl>
-                                          <p:spTgt spid="34"/>
-                                        </p:tgtEl>
-                                        <p:attrNameLst>
-                                          <p:attrName>style.visibility</p:attrName>
-                                        </p:attrNameLst>
-                                      </p:cBhvr>
-                                      <p:to>
-                                        <p:strVal val="visible"/>
-                                      </p:to>
-                                    </p:set>
-                                    <p:animEffect transition="in" filter="fade">
-                                      <p:cBhvr>
-                                        <p:cTn id="52" dur="500"/>
-                                        <p:tgtEl>
-                                          <p:spTgt spid="34"/>
-                                        </p:tgtEl>
-                                      </p:cBhvr>
-                                    </p:animEffect>
-                                  </p:childTnLst>
-                                </p:cTn>
-                              </p:par>
-                            </p:childTnLst>
-                          </p:cTn>
-                        </p:par>
-                      </p:childTnLst>
-                    </p:cTn>
-                  </p:par>
                 </p:childTnLst>
               </p:cTn>
               <p:prevCondLst>
@@ -4992,9 +4902,6 @@
         </p:cTn>
       </p:par>
     </p:tnLst>
-    <p:bldLst>
-      <p:bldP spid="34" grpId="0"/>
-    </p:bldLst>
   </p:timing>
 </p:sld>
 </file>
@@ -5033,7 +4940,7 @@
           <a:p>
             <a:r>
               <a:rPr lang="en-US" dirty="0" smtClean="0"/>
-              <a:t>Demo</a:t>
+              <a:t>PHP Scripts</a:t>
             </a:r>
             <a:endParaRPr lang="en-US" dirty="0"/>
           </a:p>
@@ -5054,22 +4961,28 @@
           <a:bodyPr/>
           <a:lstStyle/>
           <a:p>
-            <a:pPr marL="0" indent="0" algn="ctr">
-              <a:buNone/>
-            </a:pPr>
-            <a:r>
-              <a:rPr lang="en-US" dirty="0">
-                <a:hlinkClick r:id="rId2"/>
-              </a:rPr>
-              <a:t>http://</a:t>
-            </a:r>
-            <a:r>
-              <a:rPr lang="en-US" dirty="0" smtClean="0">
-                <a:hlinkClick r:id="rId2"/>
-              </a:rPr>
-              <a:t>localhost:8080/IIT-Project/index.php</a:t>
-            </a:r>
-            <a:endParaRPr lang="en-US" dirty="0" smtClean="0"/>
+            <a:r>
+              <a:rPr lang="en-US" dirty="0" smtClean="0"/>
+              <a:t>Connect with the database to add information to the database and potentially edit the information later</a:t>
+            </a:r>
+          </a:p>
+          <a:p>
+            <a:r>
+              <a:rPr lang="en-US" dirty="0" smtClean="0"/>
+              <a:t>Help keep form the database safe from SQL injections</a:t>
+            </a:r>
+          </a:p>
+          <a:p>
+            <a:r>
+              <a:rPr lang="en-US" dirty="0" smtClean="0"/>
+              <a:t>Keep information that appeared on multiple pages in separate documents</a:t>
+            </a:r>
+          </a:p>
+          <a:p>
+            <a:r>
+              <a:rPr lang="en-US" dirty="0" smtClean="0"/>
+              <a:t>Store session information to allow user login.</a:t>
+            </a:r>
           </a:p>
           <a:p>
             <a:endParaRPr lang="en-US" dirty="0"/>
@@ -5079,20 +4992,13 @@
     </p:spTree>
     <p:extLst>
       <p:ext uri="{BB962C8B-B14F-4D97-AF65-F5344CB8AC3E}">
-        <p14:creationId xmlns:p14="http://schemas.microsoft.com/office/powerpoint/2010/main" val="219420181"/>
+        <p14:creationId xmlns:p14="http://schemas.microsoft.com/office/powerpoint/2010/main" val="1516561177"/>
       </p:ext>
     </p:extLst>
   </p:cSld>
   <p:clrMapOvr>
     <a:masterClrMapping/>
   </p:clrMapOvr>
-  <p:timing>
-    <p:tnLst>
-      <p:par>
-        <p:cTn id="1" dur="indefinite" restart="never" nodeType="tmRoot"/>
-      </p:par>
-    </p:tnLst>
-  </p:timing>
 </p:sld>
 </file>
 
@@ -5130,7 +5036,7 @@
           <a:p>
             <a:r>
               <a:rPr lang="en-US" dirty="0" smtClean="0"/>
-              <a:t>Future plans</a:t>
+              <a:t>Demo</a:t>
             </a:r>
             <a:endParaRPr lang="en-US" dirty="0"/>
           </a:p>
@@ -5148,100 +5054,35 @@
         </p:nvSpPr>
         <p:spPr/>
         <p:txBody>
-          <a:bodyPr>
-            <a:normAutofit fontScale="92500" lnSpcReduction="20000"/>
-          </a:bodyPr>
+          <a:bodyPr/>
           <a:lstStyle/>
           <a:p>
-            <a:r>
-              <a:rPr lang="en-US" dirty="0" smtClean="0"/>
-              <a:t>Rent payment feature</a:t>
-            </a:r>
-          </a:p>
-          <a:p>
-            <a:r>
-              <a:rPr lang="en-US" dirty="0" smtClean="0"/>
-              <a:t>Set rewards for having a high score</a:t>
-            </a:r>
-          </a:p>
-          <a:p>
-            <a:pPr lvl="1"/>
-            <a:r>
-              <a:rPr lang="en-US" dirty="0" err="1" smtClean="0"/>
-              <a:t>ie</a:t>
-            </a:r>
-            <a:r>
-              <a:rPr lang="en-US" dirty="0" smtClean="0"/>
-              <a:t>. Decreasing rent</a:t>
-            </a:r>
-          </a:p>
-          <a:p>
-            <a:r>
-              <a:rPr lang="en-US" dirty="0" smtClean="0"/>
-              <a:t>Set punishments for having low scores</a:t>
-            </a:r>
-          </a:p>
-          <a:p>
-            <a:pPr lvl="1"/>
-            <a:r>
-              <a:rPr lang="en-US" dirty="0" err="1"/>
-              <a:t>ie</a:t>
-            </a:r>
-            <a:r>
-              <a:rPr lang="en-US" dirty="0"/>
-              <a:t>. Increasing </a:t>
-            </a:r>
-            <a:r>
-              <a:rPr lang="en-US" dirty="0" smtClean="0"/>
-              <a:t>rent</a:t>
-            </a:r>
-          </a:p>
-          <a:p>
-            <a:r>
-              <a:rPr lang="en-US" dirty="0" smtClean="0"/>
-              <a:t>Incorporate website onto college </a:t>
-            </a:r>
-            <a:r>
-              <a:rPr lang="en-US" dirty="0" smtClean="0"/>
-              <a:t>campuses</a:t>
-            </a:r>
-          </a:p>
-          <a:p>
-            <a:r>
-              <a:rPr lang="en-US" dirty="0" smtClean="0"/>
-              <a:t>Select dates for when events occur </a:t>
-            </a:r>
-          </a:p>
-          <a:p>
-            <a:r>
-              <a:rPr lang="en-US" dirty="0" smtClean="0"/>
-              <a:t>Allow users to confirm whether events happened</a:t>
-            </a:r>
-          </a:p>
-          <a:p>
-            <a:r>
-              <a:rPr lang="en-US"/>
-              <a:t>V</a:t>
-            </a:r>
-            <a:r>
-              <a:rPr lang="en-US" smtClean="0"/>
-              <a:t>ote </a:t>
-            </a:r>
-            <a:r>
-              <a:rPr lang="en-US" dirty="0" smtClean="0"/>
-              <a:t>on values of certain chores </a:t>
+            <a:pPr marL="0" indent="0" algn="ctr">
+              <a:buNone/>
+            </a:pPr>
+            <a:r>
+              <a:rPr lang="en-US" dirty="0">
+                <a:hlinkClick r:id="rId2"/>
+              </a:rPr>
+              <a:t>http://</a:t>
+            </a:r>
+            <a:r>
+              <a:rPr lang="en-US" dirty="0" smtClean="0">
+                <a:hlinkClick r:id="rId2"/>
+              </a:rPr>
+              <a:t>localhost:8080/IIT-Project/index.php</a:t>
             </a:r>
             <a:endParaRPr lang="en-US" dirty="0" smtClean="0"/>
           </a:p>
           <a:p>
-            <a:endParaRPr lang="en-US" dirty="0" smtClean="0"/>
+            <a:endParaRPr lang="en-US" dirty="0"/>
           </a:p>
         </p:txBody>
       </p:sp>
     </p:spTree>
     <p:extLst>
       <p:ext uri="{BB962C8B-B14F-4D97-AF65-F5344CB8AC3E}">
-        <p14:creationId xmlns:p14="http://schemas.microsoft.com/office/powerpoint/2010/main" val="223821961"/>
+        <p14:creationId xmlns:p14="http://schemas.microsoft.com/office/powerpoint/2010/main" val="219420181"/>
       </p:ext>
     </p:extLst>
   </p:cSld>
@@ -5292,7 +5133,162 @@
           <a:p>
             <a:r>
               <a:rPr lang="en-US" dirty="0" smtClean="0"/>
-              <a:t>questions</a:t>
+              <a:t>Future plans</a:t>
+            </a:r>
+            <a:endParaRPr lang="en-US" dirty="0"/>
+          </a:p>
+        </p:txBody>
+      </p:sp>
+      <p:sp>
+        <p:nvSpPr>
+          <p:cNvPr id="3" name="Content Placeholder 2"/>
+          <p:cNvSpPr>
+            <a:spLocks noGrp="1"/>
+          </p:cNvSpPr>
+          <p:nvPr>
+            <p:ph idx="1"/>
+          </p:nvPr>
+        </p:nvSpPr>
+        <p:spPr/>
+        <p:txBody>
+          <a:bodyPr>
+            <a:normAutofit fontScale="92500" lnSpcReduction="20000"/>
+          </a:bodyPr>
+          <a:lstStyle/>
+          <a:p>
+            <a:r>
+              <a:rPr lang="en-US" dirty="0" smtClean="0"/>
+              <a:t>Select dates when events occurred</a:t>
+            </a:r>
+          </a:p>
+          <a:p>
+            <a:r>
+              <a:rPr lang="en-US" dirty="0" smtClean="0"/>
+              <a:t>Allow other users to confirm events</a:t>
+            </a:r>
+          </a:p>
+          <a:p>
+            <a:r>
+              <a:rPr lang="en-US" dirty="0" smtClean="0"/>
+              <a:t>Vote on value of certain chores</a:t>
+            </a:r>
+          </a:p>
+          <a:p>
+            <a:r>
+              <a:rPr lang="en-US" dirty="0" smtClean="0"/>
+              <a:t>Rent </a:t>
+            </a:r>
+            <a:r>
+              <a:rPr lang="en-US" dirty="0" smtClean="0"/>
+              <a:t>payment feature</a:t>
+            </a:r>
+          </a:p>
+          <a:p>
+            <a:r>
+              <a:rPr lang="en-US" dirty="0" smtClean="0"/>
+              <a:t>Set rewards for having a high score</a:t>
+            </a:r>
+          </a:p>
+          <a:p>
+            <a:pPr lvl="1"/>
+            <a:r>
+              <a:rPr lang="en-US" dirty="0" err="1" smtClean="0"/>
+              <a:t>ie</a:t>
+            </a:r>
+            <a:r>
+              <a:rPr lang="en-US" dirty="0" smtClean="0"/>
+              <a:t>. Decreasing rent</a:t>
+            </a:r>
+          </a:p>
+          <a:p>
+            <a:r>
+              <a:rPr lang="en-US" dirty="0" smtClean="0"/>
+              <a:t>Set punishments for having low scores</a:t>
+            </a:r>
+          </a:p>
+          <a:p>
+            <a:pPr lvl="1"/>
+            <a:r>
+              <a:rPr lang="en-US" dirty="0" err="1"/>
+              <a:t>ie</a:t>
+            </a:r>
+            <a:r>
+              <a:rPr lang="en-US" dirty="0"/>
+              <a:t>. Increasing </a:t>
+            </a:r>
+            <a:r>
+              <a:rPr lang="en-US" dirty="0" smtClean="0"/>
+              <a:t>rent</a:t>
+            </a:r>
+          </a:p>
+          <a:p>
+            <a:r>
+              <a:rPr lang="en-US" dirty="0" smtClean="0"/>
+              <a:t>Incorporate website onto college </a:t>
+            </a:r>
+            <a:r>
+              <a:rPr lang="en-US" dirty="0" smtClean="0"/>
+              <a:t>campuses</a:t>
+            </a:r>
+            <a:endParaRPr lang="en-US" dirty="0" smtClean="0"/>
+          </a:p>
+        </p:txBody>
+      </p:sp>
+    </p:spTree>
+    <p:extLst>
+      <p:ext uri="{BB962C8B-B14F-4D97-AF65-F5344CB8AC3E}">
+        <p14:creationId xmlns:p14="http://schemas.microsoft.com/office/powerpoint/2010/main" val="223821961"/>
+      </p:ext>
+    </p:extLst>
+  </p:cSld>
+  <p:clrMapOvr>
+    <a:masterClrMapping/>
+  </p:clrMapOvr>
+  <p:timing>
+    <p:tnLst>
+      <p:par>
+        <p:cTn id="1" dur="indefinite" restart="never" nodeType="tmRoot"/>
+      </p:par>
+    </p:tnLst>
+  </p:timing>
+</p:sld>
+</file>
+
+<file path=ppt/slides/slide15.xml><?xml version="1.0" encoding="utf-8"?>
+<p:sld xmlns:a="http://schemas.openxmlformats.org/drawingml/2006/main" xmlns:r="http://schemas.openxmlformats.org/officeDocument/2006/relationships" xmlns:p="http://schemas.openxmlformats.org/presentationml/2006/main">
+  <p:cSld>
+    <p:spTree>
+      <p:nvGrpSpPr>
+        <p:cNvPr id="1" name=""/>
+        <p:cNvGrpSpPr/>
+        <p:nvPr/>
+      </p:nvGrpSpPr>
+      <p:grpSpPr>
+        <a:xfrm>
+          <a:off x="0" y="0"/>
+          <a:ext cx="0" cy="0"/>
+          <a:chOff x="0" y="0"/>
+          <a:chExt cx="0" cy="0"/>
+        </a:xfrm>
+      </p:grpSpPr>
+      <p:sp>
+        <p:nvSpPr>
+          <p:cNvPr id="2" name="Title 1"/>
+          <p:cNvSpPr>
+            <a:spLocks noGrp="1"/>
+          </p:cNvSpPr>
+          <p:nvPr>
+            <p:ph type="title"/>
+          </p:nvPr>
+        </p:nvSpPr>
+        <p:spPr/>
+        <p:txBody>
+          <a:bodyPr/>
+          <a:lstStyle/>
+          <a:p>
+            <a:r>
+              <a:rPr lang="en-US" dirty="0" smtClean="0"/>
+              <a:t>questions?</a:t>
             </a:r>
             <a:endParaRPr lang="en-US" dirty="0"/>
           </a:p>

</xml_diff>